<commit_message>
Assignment 1 gant chart is up
</commit_message>
<xml_diff>
--- a/docs/PARKIT Powerpoint.pptx
+++ b/docs/PARKIT Powerpoint.pptx
@@ -5,7 +5,7 @@
     <p:sldMasterId id="2147483648" r:id="rId1"/>
   </p:sldMasterIdLst>
   <p:notesMasterIdLst>
-    <p:notesMasterId r:id="rId24"/>
+    <p:notesMasterId r:id="rId25"/>
   </p:notesMasterIdLst>
   <p:sldIdLst>
     <p:sldId id="268" r:id="rId2"/>
@@ -25,11 +25,12 @@
     <p:sldId id="267" r:id="rId16"/>
     <p:sldId id="275" r:id="rId17"/>
     <p:sldId id="271" r:id="rId18"/>
-    <p:sldId id="272" r:id="rId19"/>
-    <p:sldId id="273" r:id="rId20"/>
-    <p:sldId id="274" r:id="rId21"/>
-    <p:sldId id="276" r:id="rId22"/>
-    <p:sldId id="277" r:id="rId23"/>
+    <p:sldId id="278" r:id="rId19"/>
+    <p:sldId id="272" r:id="rId20"/>
+    <p:sldId id="273" r:id="rId21"/>
+    <p:sldId id="274" r:id="rId22"/>
+    <p:sldId id="276" r:id="rId23"/>
+    <p:sldId id="277" r:id="rId24"/>
   </p:sldIdLst>
   <p:sldSz cx="13004800" cy="9753600"/>
   <p:notesSz cx="6858000" cy="9144000"/>
@@ -331,6 +332,11 @@
       </a:defRPr>
     </a:lvl9pPr>
   </p:defaultTextStyle>
+  <p:extLst>
+    <p:ext uri="{EFAFB233-063F-42B5-8137-9DF3F51BA10A}">
+      <p15:sldGuideLst xmlns:p15="http://schemas.microsoft.com/office/powerpoint/2012/main"/>
+    </p:ext>
+  </p:extLst>
 </p:presentation>
 </file>
 
@@ -2921,10 +2927,18 @@
           <a:lstStyle/>
           <a:p>
             <a:r>
-              <a:rPr lang="en-US" dirty="0" smtClean="0"/>
-              <a:t>PARKIT</a:t>
-            </a:r>
-            <a:endParaRPr lang="en-US" dirty="0"/>
+              <a:rPr lang="en-US" dirty="0" smtClean="0">
+                <a:latin typeface="+mj-lt"/>
+                <a:ea typeface="Comic Sans MS" charset="0"/>
+                <a:cs typeface="Comic Sans MS" charset="0"/>
+              </a:rPr>
+              <a:t>P  A  R  K  I  T</a:t>
+            </a:r>
+            <a:endParaRPr lang="en-US" dirty="0">
+              <a:latin typeface="+mj-lt"/>
+              <a:ea typeface="Comic Sans MS" charset="0"/>
+              <a:cs typeface="Comic Sans MS" charset="0"/>
+            </a:endParaRPr>
           </a:p>
         </p:txBody>
       </p:sp>
@@ -2940,14 +2954,44 @@
         </p:nvSpPr>
         <p:spPr/>
         <p:txBody>
-          <a:bodyPr/>
+          <a:bodyPr>
+            <a:normAutofit fontScale="85000" lnSpcReduction="20000"/>
+          </a:bodyPr>
           <a:lstStyle/>
           <a:p>
             <a:r>
-              <a:rPr lang="en-US" dirty="0"/>
-              <a:t>Peyton Cross</a:t>
-            </a:r>
-            <a:endParaRPr lang="en-US" dirty="0"/>
+              <a:rPr lang="en-US" dirty="0" smtClean="0">
+                <a:latin typeface="Comic Sans MS" charset="0"/>
+                <a:ea typeface="Comic Sans MS" charset="0"/>
+                <a:cs typeface="Comic Sans MS" charset="0"/>
+              </a:rPr>
+              <a:t>”Make Parking Great Again”</a:t>
+            </a:r>
+          </a:p>
+          <a:p>
+            <a:endParaRPr lang="en-US" dirty="0" smtClean="0">
+              <a:latin typeface="Comic Sans MS" charset="0"/>
+              <a:ea typeface="Comic Sans MS" charset="0"/>
+              <a:cs typeface="Comic Sans MS" charset="0"/>
+            </a:endParaRPr>
+          </a:p>
+          <a:p>
+            <a:r>
+              <a:rPr lang="en-US" dirty="0" smtClean="0">
+                <a:latin typeface="Comic Sans MS" charset="0"/>
+                <a:ea typeface="Comic Sans MS" charset="0"/>
+                <a:cs typeface="Comic Sans MS" charset="0"/>
+              </a:rPr>
+              <a:t>Peyton </a:t>
+            </a:r>
+            <a:r>
+              <a:rPr lang="en-US" dirty="0">
+                <a:latin typeface="Comic Sans MS" charset="0"/>
+                <a:ea typeface="Comic Sans MS" charset="0"/>
+                <a:cs typeface="Comic Sans MS" charset="0"/>
+              </a:rPr>
+              <a:t>Cross</a:t>
+            </a:r>
           </a:p>
         </p:txBody>
       </p:sp>
@@ -2962,6 +3006,13 @@
     <a:masterClrMapping/>
   </p:clrMapOvr>
   <p:transition spd="med"/>
+  <p:timing>
+    <p:tnLst>
+      <p:par>
+        <p:cTn id="1" dur="indefinite" restart="never" nodeType="tmRoot"/>
+      </p:par>
+    </p:tnLst>
+  </p:timing>
 </p:sld>
 </file>
 
@@ -4494,6 +4545,13 @@
     <a:masterClrMapping/>
   </p:clrMapOvr>
   <p:transition spd="med"/>
+  <p:timing>
+    <p:tnLst>
+      <p:par>
+        <p:cTn id="1" dur="indefinite" restart="never" nodeType="tmRoot"/>
+      </p:par>
+    </p:tnLst>
+  </p:timing>
 </p:sld>
 </file>
 
@@ -4530,10 +4588,18 @@
           <a:lstStyle/>
           <a:p>
             <a:r>
-              <a:rPr lang="en-US" dirty="0" smtClean="0"/>
+              <a:rPr lang="en-US" dirty="0" smtClean="0">
+                <a:latin typeface="Comic Sans MS" charset="0"/>
+                <a:ea typeface="Comic Sans MS" charset="0"/>
+                <a:cs typeface="Comic Sans MS" charset="0"/>
+              </a:rPr>
               <a:t>Technologies Used</a:t>
             </a:r>
-            <a:endParaRPr lang="en-US" dirty="0"/>
+            <a:endParaRPr lang="en-US" dirty="0">
+              <a:latin typeface="Comic Sans MS" charset="0"/>
+              <a:ea typeface="Comic Sans MS" charset="0"/>
+              <a:cs typeface="Comic Sans MS" charset="0"/>
+            </a:endParaRPr>
           </a:p>
         </p:txBody>
       </p:sp>
@@ -4555,48 +4621,60 @@
           <a:lstStyle/>
           <a:p>
             <a:r>
-              <a:rPr lang="en-US" dirty="0" err="1"/>
-              <a:t>Xcode</a:t>
-            </a:r>
-            <a:endParaRPr lang="en-US" dirty="0"/>
-          </a:p>
-          <a:p>
-            <a:r>
-              <a:rPr lang="en-US" dirty="0" err="1"/>
+              <a:rPr lang="en-US" dirty="0" smtClean="0">
+                <a:latin typeface="Comic Sans MS" charset="0"/>
+                <a:ea typeface="Comic Sans MS" charset="0"/>
+                <a:cs typeface="Comic Sans MS" charset="0"/>
+              </a:rPr>
+              <a:t>Android Studio</a:t>
+            </a:r>
+          </a:p>
+          <a:p>
+            <a:r>
+              <a:rPr lang="en-US" dirty="0" smtClean="0">
+                <a:latin typeface="Comic Sans MS" charset="0"/>
+                <a:ea typeface="Comic Sans MS" charset="0"/>
+                <a:cs typeface="Comic Sans MS" charset="0"/>
+              </a:rPr>
+              <a:t>Java</a:t>
+            </a:r>
+            <a:endParaRPr lang="en-US" dirty="0">
+              <a:latin typeface="Comic Sans MS" charset="0"/>
+              <a:ea typeface="Comic Sans MS" charset="0"/>
+              <a:cs typeface="Comic Sans MS" charset="0"/>
+            </a:endParaRPr>
+          </a:p>
+          <a:p>
+            <a:r>
+              <a:rPr lang="en-US" dirty="0" err="1" smtClean="0">
+                <a:latin typeface="Comic Sans MS" charset="0"/>
+                <a:ea typeface="Comic Sans MS" charset="0"/>
+                <a:cs typeface="Comic Sans MS" charset="0"/>
+              </a:rPr>
               <a:t>NodeJS</a:t>
             </a:r>
-            <a:endParaRPr lang="en-US" dirty="0"/>
-          </a:p>
-          <a:p>
-            <a:r>
-              <a:rPr lang="en-US" dirty="0" smtClean="0"/>
-              <a:t>Swift</a:t>
-            </a:r>
-            <a:endParaRPr lang="en-US" dirty="0"/>
-          </a:p>
-          <a:p>
-            <a:r>
-              <a:rPr lang="en-US"/>
-              <a:t>Digital </a:t>
-            </a:r>
-            <a:r>
-              <a:rPr lang="en-US" smtClean="0"/>
-              <a:t>Ocean</a:t>
-            </a:r>
-            <a:endParaRPr lang="en-US" dirty="0" smtClean="0"/>
-          </a:p>
-          <a:p>
-            <a:r>
-              <a:rPr lang="en-US" dirty="0" smtClean="0"/>
-              <a:t>Nginx</a:t>
-            </a:r>
-          </a:p>
-          <a:p>
-            <a:r>
-              <a:rPr lang="en-US" dirty="0" smtClean="0"/>
-              <a:t>MySQL</a:t>
-            </a:r>
-            <a:endParaRPr lang="en-US" dirty="0"/>
+            <a:endParaRPr lang="en-US" dirty="0" smtClean="0">
+              <a:latin typeface="Comic Sans MS" charset="0"/>
+              <a:ea typeface="Comic Sans MS" charset="0"/>
+              <a:cs typeface="Comic Sans MS" charset="0"/>
+            </a:endParaRPr>
+          </a:p>
+          <a:p>
+            <a:r>
+              <a:rPr lang="en-US" dirty="0">
+                <a:latin typeface="Comic Sans MS" charset="0"/>
+                <a:ea typeface="Comic Sans MS" charset="0"/>
+                <a:cs typeface="Comic Sans MS" charset="0"/>
+              </a:rPr>
+              <a:t>Digital Ocean</a:t>
+            </a:r>
+          </a:p>
+          <a:p>
+            <a:endParaRPr lang="en-US" dirty="0">
+              <a:latin typeface="Comic Sans MS" charset="0"/>
+              <a:ea typeface="Comic Sans MS" charset="0"/>
+              <a:cs typeface="Comic Sans MS" charset="0"/>
+            </a:endParaRPr>
           </a:p>
         </p:txBody>
       </p:sp>
@@ -4611,6 +4689,13 @@
     <a:masterClrMapping/>
   </p:clrMapOvr>
   <p:transition spd="med"/>
+  <p:timing>
+    <p:tnLst>
+      <p:par>
+        <p:cTn id="1" dur="indefinite" restart="never" nodeType="tmRoot"/>
+      </p:par>
+    </p:tnLst>
+  </p:timing>
 </p:sld>
 </file>
 
@@ -4649,10 +4734,18 @@
           <a:lstStyle/>
           <a:p>
             <a:r>
-              <a:rPr lang="en-US" dirty="0" smtClean="0"/>
-              <a:t>Preliminary Development Schedule</a:t>
-            </a:r>
-            <a:endParaRPr lang="en-US" dirty="0"/>
+              <a:rPr lang="en-US" dirty="0" smtClean="0">
+                <a:latin typeface="Comic Sans MS" charset="0"/>
+                <a:ea typeface="Comic Sans MS" charset="0"/>
+                <a:cs typeface="Comic Sans MS" charset="0"/>
+              </a:rPr>
+              <a:t>Technologies Used (continued)</a:t>
+            </a:r>
+            <a:endParaRPr lang="en-US" dirty="0">
+              <a:latin typeface="Comic Sans MS" charset="0"/>
+              <a:ea typeface="Comic Sans MS" charset="0"/>
+              <a:cs typeface="Comic Sans MS" charset="0"/>
+            </a:endParaRPr>
           </a:p>
         </p:txBody>
       </p:sp>
@@ -4668,55 +4761,74 @@
         </p:nvSpPr>
         <p:spPr/>
         <p:txBody>
-          <a:bodyPr>
-            <a:normAutofit fontScale="92500" lnSpcReduction="20000"/>
-          </a:bodyPr>
+          <a:bodyPr/>
           <a:lstStyle/>
           <a:p>
             <a:r>
-              <a:rPr lang="en-US" dirty="0"/>
-              <a:t>January 14th - Registration and User Authentication should be implemented</a:t>
-            </a:r>
-            <a:endParaRPr lang="en-US" dirty="0"/>
-          </a:p>
-          <a:p>
-            <a:r>
-              <a:rPr lang="en-US" dirty="0"/>
-              <a:t>January 20th - The parker should be able to reserve, check-in and check-out</a:t>
-            </a:r>
-            <a:endParaRPr lang="en-US" dirty="0"/>
-          </a:p>
-          <a:p>
-            <a:r>
-              <a:rPr lang="en-US" dirty="0"/>
-              <a:t>January 27th - A payment system should be implemented</a:t>
-            </a:r>
-            <a:endParaRPr lang="en-US" dirty="0"/>
-          </a:p>
-          <a:p>
-            <a:r>
-              <a:rPr lang="en-US" dirty="0"/>
-              <a:t>February 10th - User reporting is implemented and all high priority features are implemented</a:t>
-            </a:r>
-            <a:endParaRPr lang="en-US" dirty="0"/>
-          </a:p>
-          <a:p>
-            <a:r>
-              <a:rPr lang="en-US" dirty="0"/>
-              <a:t>February 17th - Most graphical information such as maps and display rates are </a:t>
-            </a:r>
-            <a:r>
-              <a:rPr lang="en-US" dirty="0" smtClean="0"/>
-              <a:t>implemented</a:t>
-            </a:r>
-            <a:endParaRPr lang="en-US" dirty="0"/>
+              <a:rPr lang="en-US" dirty="0">
+                <a:latin typeface="Comic Sans MS" charset="0"/>
+                <a:ea typeface="Comic Sans MS" charset="0"/>
+                <a:cs typeface="Comic Sans MS" charset="0"/>
+              </a:rPr>
+              <a:t>Nginx</a:t>
+            </a:r>
+          </a:p>
+          <a:p>
+            <a:r>
+              <a:rPr lang="en-US" dirty="0" smtClean="0">
+                <a:latin typeface="Comic Sans MS" charset="0"/>
+                <a:ea typeface="Comic Sans MS" charset="0"/>
+                <a:cs typeface="Comic Sans MS" charset="0"/>
+              </a:rPr>
+              <a:t>MySQL</a:t>
+            </a:r>
+          </a:p>
+          <a:p>
+            <a:r>
+              <a:rPr lang="en-US" dirty="0" smtClean="0">
+                <a:latin typeface="Comic Sans MS" charset="0"/>
+                <a:ea typeface="Comic Sans MS" charset="0"/>
+                <a:cs typeface="Comic Sans MS" charset="0"/>
+              </a:rPr>
+              <a:t>LMU Build</a:t>
+            </a:r>
+          </a:p>
+          <a:p>
+            <a:r>
+              <a:rPr lang="en-US" dirty="0" smtClean="0">
+                <a:latin typeface="Comic Sans MS" charset="0"/>
+                <a:ea typeface="Comic Sans MS" charset="0"/>
+                <a:cs typeface="Comic Sans MS" charset="0"/>
+              </a:rPr>
+              <a:t>Google Maps </a:t>
+            </a:r>
+            <a:r>
+              <a:rPr lang="en-US" dirty="0" err="1" smtClean="0">
+                <a:latin typeface="Comic Sans MS" charset="0"/>
+                <a:ea typeface="Comic Sans MS" charset="0"/>
+                <a:cs typeface="Comic Sans MS" charset="0"/>
+              </a:rPr>
+              <a:t>api</a:t>
+            </a:r>
+            <a:endParaRPr lang="en-US" dirty="0">
+              <a:latin typeface="Comic Sans MS" charset="0"/>
+              <a:ea typeface="Comic Sans MS" charset="0"/>
+              <a:cs typeface="Comic Sans MS" charset="0"/>
+            </a:endParaRPr>
+          </a:p>
+          <a:p>
+            <a:endParaRPr lang="en-US" dirty="0">
+              <a:latin typeface="Comic Sans MS" charset="0"/>
+              <a:ea typeface="Comic Sans MS" charset="0"/>
+              <a:cs typeface="Comic Sans MS" charset="0"/>
+            </a:endParaRPr>
           </a:p>
         </p:txBody>
       </p:sp>
     </p:spTree>
     <p:extLst>
       <p:ext uri="{BB962C8B-B14F-4D97-AF65-F5344CB8AC3E}">
-        <p14:creationId xmlns:p14="http://schemas.microsoft.com/office/powerpoint/2010/main" val="321038361"/>
+        <p14:creationId xmlns:p14="http://schemas.microsoft.com/office/powerpoint/2010/main" val="970911522"/>
       </p:ext>
     </p:extLst>
   </p:cSld>
@@ -4724,6 +4836,13 @@
     <a:masterClrMapping/>
   </p:clrMapOvr>
   <p:transition spd="med"/>
+  <p:timing>
+    <p:tnLst>
+      <p:par>
+        <p:cTn id="1" dur="indefinite" restart="never" nodeType="tmRoot"/>
+      </p:par>
+    </p:tnLst>
+  </p:timing>
 </p:sld>
 </file>
 
@@ -4762,10 +4881,18 @@
           <a:lstStyle/>
           <a:p>
             <a:r>
-              <a:rPr lang="en-US" dirty="0"/>
-              <a:t>Preliminary Development Schedule (Continued)</a:t>
-            </a:r>
-            <a:endParaRPr lang="en-US" dirty="0"/>
+              <a:rPr lang="en-US" dirty="0" smtClean="0">
+                <a:latin typeface="Comic Sans MS" charset="0"/>
+                <a:ea typeface="Comic Sans MS" charset="0"/>
+                <a:cs typeface="Comic Sans MS" charset="0"/>
+              </a:rPr>
+              <a:t>Preliminary Development Schedule</a:t>
+            </a:r>
+            <a:endParaRPr lang="en-US" dirty="0">
+              <a:latin typeface="Comic Sans MS" charset="0"/>
+              <a:ea typeface="Comic Sans MS" charset="0"/>
+              <a:cs typeface="Comic Sans MS" charset="0"/>
+            </a:endParaRPr>
           </a:p>
         </p:txBody>
       </p:sp>
@@ -4787,85 +4914,103 @@
           <a:lstStyle/>
           <a:p>
             <a:r>
-              <a:rPr lang="en-US" dirty="0"/>
-              <a:t>March 11th - Admin GUI is implemented and Medium priority features should be implemented</a:t>
-            </a:r>
-            <a:endParaRPr lang="en-US" dirty="0"/>
-          </a:p>
-          <a:p>
-            <a:r>
-              <a:rPr lang="en-US" dirty="0"/>
-              <a:t>April 3rd - Low priority features are implemented and the </a:t>
-            </a:r>
-            <a:r>
-              <a:rPr lang="en-US" dirty="0" smtClean="0"/>
-              <a:t>app </a:t>
-            </a:r>
-            <a:r>
-              <a:rPr lang="en-US" dirty="0"/>
-              <a:t>is in Alpha</a:t>
-            </a:r>
-            <a:endParaRPr lang="en-US" dirty="0"/>
-          </a:p>
-          <a:p>
-            <a:r>
-              <a:rPr lang="en-US" dirty="0"/>
-              <a:t>May 1st - </a:t>
-            </a:r>
-            <a:r>
-              <a:rPr lang="en-US" dirty="0" err="1"/>
-              <a:t>Parkit</a:t>
-            </a:r>
-            <a:r>
-              <a:rPr lang="en-US" dirty="0"/>
-              <a:t> is </a:t>
-            </a:r>
-            <a:r>
-              <a:rPr lang="en-US" dirty="0" smtClean="0"/>
-              <a:t>scheduled </a:t>
-            </a:r>
-            <a:r>
-              <a:rPr lang="en-US" dirty="0"/>
-              <a:t>for Beta</a:t>
-            </a:r>
-            <a:endParaRPr lang="en-US" dirty="0"/>
-          </a:p>
-          <a:p>
-            <a:r>
-              <a:rPr lang="en-US" dirty="0"/>
-              <a:t>June 5th </a:t>
-            </a:r>
-            <a:r>
-              <a:rPr lang="mr-IN" dirty="0" smtClean="0"/>
-              <a:t>–</a:t>
-            </a:r>
-            <a:r>
-              <a:rPr lang="en-US" dirty="0" smtClean="0"/>
-              <a:t> </a:t>
-            </a:r>
-            <a:r>
-              <a:rPr lang="en-US" dirty="0" err="1" smtClean="0"/>
-              <a:t>Parkit</a:t>
-            </a:r>
-            <a:r>
-              <a:rPr lang="en-US" dirty="0" smtClean="0"/>
-              <a:t> is scheduled for </a:t>
-            </a:r>
-            <a:r>
-              <a:rPr lang="en-US" dirty="0"/>
-              <a:t>released</a:t>
-            </a:r>
-            <a:endParaRPr lang="en-US" dirty="0"/>
-          </a:p>
-          <a:p>
-            <a:endParaRPr lang="en-US" dirty="0"/>
+              <a:rPr lang="en-US" dirty="0">
+                <a:latin typeface="Comic Sans MS" charset="0"/>
+                <a:ea typeface="Comic Sans MS" charset="0"/>
+                <a:cs typeface="Comic Sans MS" charset="0"/>
+              </a:rPr>
+              <a:t>January </a:t>
+            </a:r>
+            <a:r>
+              <a:rPr lang="en-US" dirty="0">
+                <a:latin typeface="Comic Sans MS" charset="0"/>
+                <a:ea typeface="Comic Sans MS" charset="0"/>
+                <a:cs typeface="Comic Sans MS" charset="0"/>
+              </a:rPr>
+              <a:t>2</a:t>
+            </a:r>
+            <a:r>
+              <a:rPr lang="en-US" dirty="0" smtClean="0">
+                <a:latin typeface="Comic Sans MS" charset="0"/>
+                <a:ea typeface="Comic Sans MS" charset="0"/>
+                <a:cs typeface="Comic Sans MS" charset="0"/>
+              </a:rPr>
+              <a:t>5th </a:t>
+            </a:r>
+            <a:r>
+              <a:rPr lang="en-US" dirty="0">
+                <a:latin typeface="Comic Sans MS" charset="0"/>
+                <a:ea typeface="Comic Sans MS" charset="0"/>
+                <a:cs typeface="Comic Sans MS" charset="0"/>
+              </a:rPr>
+              <a:t>- Registration and User Authentication should be implemented</a:t>
+            </a:r>
+          </a:p>
+          <a:p>
+            <a:r>
+              <a:rPr lang="en-US" dirty="0" smtClean="0">
+                <a:latin typeface="Comic Sans MS" charset="0"/>
+                <a:ea typeface="Comic Sans MS" charset="0"/>
+                <a:cs typeface="Comic Sans MS" charset="0"/>
+              </a:rPr>
+              <a:t>February</a:t>
+            </a:r>
+            <a:r>
+              <a:rPr lang="en-US" dirty="0" smtClean="0">
+                <a:latin typeface="Comic Sans MS" charset="0"/>
+                <a:ea typeface="Comic Sans MS" charset="0"/>
+                <a:cs typeface="Comic Sans MS" charset="0"/>
+              </a:rPr>
+              <a:t> 5th </a:t>
+            </a:r>
+            <a:r>
+              <a:rPr lang="en-US" dirty="0">
+                <a:latin typeface="Comic Sans MS" charset="0"/>
+                <a:ea typeface="Comic Sans MS" charset="0"/>
+                <a:cs typeface="Comic Sans MS" charset="0"/>
+              </a:rPr>
+              <a:t>- A payment system should be implemented</a:t>
+            </a:r>
+          </a:p>
+          <a:p>
+            <a:r>
+              <a:rPr lang="en-US" dirty="0">
+                <a:latin typeface="Comic Sans MS" charset="0"/>
+                <a:ea typeface="Comic Sans MS" charset="0"/>
+                <a:cs typeface="Comic Sans MS" charset="0"/>
+              </a:rPr>
+              <a:t>February 10th - User reporting is implemented and all high priority features are implemented</a:t>
+            </a:r>
+          </a:p>
+          <a:p>
+            <a:r>
+              <a:rPr lang="en-US" dirty="0">
+                <a:latin typeface="Comic Sans MS" charset="0"/>
+                <a:ea typeface="Comic Sans MS" charset="0"/>
+                <a:cs typeface="Comic Sans MS" charset="0"/>
+              </a:rPr>
+              <a:t>February 17th - Most graphical information such as maps and display rates are </a:t>
+            </a:r>
+            <a:r>
+              <a:rPr lang="en-US" dirty="0" smtClean="0">
+                <a:latin typeface="Comic Sans MS" charset="0"/>
+                <a:ea typeface="Comic Sans MS" charset="0"/>
+                <a:cs typeface="Comic Sans MS" charset="0"/>
+              </a:rPr>
+              <a:t>implemented</a:t>
+            </a:r>
+            <a:endParaRPr lang="en-US" dirty="0">
+              <a:latin typeface="Comic Sans MS" charset="0"/>
+              <a:ea typeface="Comic Sans MS" charset="0"/>
+              <a:cs typeface="Comic Sans MS" charset="0"/>
+            </a:endParaRPr>
           </a:p>
         </p:txBody>
       </p:sp>
     </p:spTree>
     <p:extLst>
       <p:ext uri="{BB962C8B-B14F-4D97-AF65-F5344CB8AC3E}">
-        <p14:creationId xmlns:p14="http://schemas.microsoft.com/office/powerpoint/2010/main" val="892509732"/>
+        <p14:creationId xmlns:p14="http://schemas.microsoft.com/office/powerpoint/2010/main" val="321038361"/>
       </p:ext>
     </p:extLst>
   </p:cSld>
@@ -4873,6 +5018,13 @@
     <a:masterClrMapping/>
   </p:clrMapOvr>
   <p:transition spd="med"/>
+  <p:timing>
+    <p:tnLst>
+      <p:par>
+        <p:cTn id="1" dur="indefinite" restart="never" nodeType="tmRoot"/>
+      </p:par>
+    </p:tnLst>
+  </p:timing>
 </p:sld>
 </file>
 
@@ -4909,10 +5061,13 @@
           <a:lstStyle/>
           <a:p>
             <a:r>
-              <a:rPr lang="en-US" dirty="0"/>
+              <a:rPr lang="en-US" dirty="0">
+                <a:latin typeface="Comic Sans MS" charset="0"/>
+                <a:ea typeface="Comic Sans MS" charset="0"/>
+                <a:cs typeface="Comic Sans MS" charset="0"/>
+              </a:rPr>
               <a:t>Project Proposal</a:t>
             </a:r>
-            <a:endParaRPr lang="en-US" dirty="0"/>
           </a:p>
         </p:txBody>
       </p:sp>
@@ -4932,35 +5087,69 @@
           <a:lstStyle/>
           <a:p>
             <a:r>
-              <a:rPr lang="en-US" dirty="0" err="1"/>
-              <a:t>Parkit</a:t>
-            </a:r>
-            <a:r>
-              <a:rPr lang="en-US" dirty="0"/>
-              <a:t> is a platform that aims to remove the pain of </a:t>
-            </a:r>
-            <a:r>
-              <a:rPr lang="en-US" dirty="0" smtClean="0"/>
+              <a:rPr lang="en-US" dirty="0">
+                <a:latin typeface="Comic Sans MS" charset="0"/>
+                <a:ea typeface="Comic Sans MS" charset="0"/>
+                <a:cs typeface="Comic Sans MS" charset="0"/>
+              </a:rPr>
+              <a:t>Parkit is </a:t>
+            </a:r>
+            <a:r>
+              <a:rPr lang="en-US" dirty="0" smtClean="0">
+                <a:latin typeface="Comic Sans MS" charset="0"/>
+                <a:ea typeface="Comic Sans MS" charset="0"/>
+                <a:cs typeface="Comic Sans MS" charset="0"/>
+              </a:rPr>
+              <a:t>a cross-platform application that </a:t>
+            </a:r>
+            <a:r>
+              <a:rPr lang="en-US" dirty="0">
+                <a:latin typeface="Comic Sans MS" charset="0"/>
+                <a:ea typeface="Comic Sans MS" charset="0"/>
+                <a:cs typeface="Comic Sans MS" charset="0"/>
+              </a:rPr>
+              <a:t>aims to remove the pain of </a:t>
+            </a:r>
+            <a:r>
+              <a:rPr lang="en-US" dirty="0" smtClean="0">
+                <a:latin typeface="Comic Sans MS" charset="0"/>
+                <a:ea typeface="Comic Sans MS" charset="0"/>
+                <a:cs typeface="Comic Sans MS" charset="0"/>
+              </a:rPr>
               <a:t>parking.</a:t>
             </a:r>
-            <a:endParaRPr lang="en-US" dirty="0"/>
-          </a:p>
-          <a:p>
-            <a:r>
-              <a:rPr lang="en-US" dirty="0"/>
+            <a:endParaRPr lang="en-US" dirty="0">
+              <a:latin typeface="Comic Sans MS" charset="0"/>
+              <a:ea typeface="Comic Sans MS" charset="0"/>
+              <a:cs typeface="Comic Sans MS" charset="0"/>
+            </a:endParaRPr>
+          </a:p>
+          <a:p>
+            <a:r>
+              <a:rPr lang="en-US" dirty="0">
+                <a:latin typeface="Comic Sans MS" charset="0"/>
+                <a:ea typeface="Comic Sans MS" charset="0"/>
+                <a:cs typeface="Comic Sans MS" charset="0"/>
+              </a:rPr>
               <a:t>It allows homeowners to rent out their driveway to people looking for a place to park.</a:t>
             </a:r>
-            <a:endParaRPr lang="en-US" dirty="0"/>
-          </a:p>
-          <a:p>
-            <a:r>
-              <a:rPr lang="en-US" dirty="0"/>
+          </a:p>
+          <a:p>
+            <a:r>
+              <a:rPr lang="en-US" dirty="0">
+                <a:latin typeface="Comic Sans MS" charset="0"/>
+                <a:ea typeface="Comic Sans MS" charset="0"/>
+                <a:cs typeface="Comic Sans MS" charset="0"/>
+              </a:rPr>
               <a:t>The target audience are millennials for parkers and new homeowners for stall owners.</a:t>
             </a:r>
-            <a:endParaRPr lang="en-US" dirty="0"/>
-          </a:p>
-          <a:p>
-            <a:endParaRPr lang="en-US" dirty="0"/>
+          </a:p>
+          <a:p>
+            <a:endParaRPr lang="en-US" dirty="0">
+              <a:latin typeface="Comic Sans MS" charset="0"/>
+              <a:ea typeface="Comic Sans MS" charset="0"/>
+              <a:cs typeface="Comic Sans MS" charset="0"/>
+            </a:endParaRPr>
           </a:p>
         </p:txBody>
       </p:sp>
@@ -4975,6 +5164,13 @@
     <a:masterClrMapping/>
   </p:clrMapOvr>
   <p:transition spd="med"/>
+  <p:timing>
+    <p:tnLst>
+      <p:par>
+        <p:cTn id="1" dur="indefinite" restart="never" nodeType="tmRoot"/>
+      </p:par>
+    </p:tnLst>
+  </p:timing>
 </p:sld>
 </file>
 
@@ -5007,14 +5203,19 @@
         </p:nvSpPr>
         <p:spPr/>
         <p:txBody>
-          <a:bodyPr/>
+          <a:bodyPr>
+            <a:normAutofit fontScale="90000"/>
+          </a:bodyPr>
           <a:lstStyle/>
           <a:p>
             <a:r>
-              <a:rPr lang="en-US" dirty="0" smtClean="0"/>
-              <a:t>Conclusion</a:t>
-            </a:r>
-            <a:endParaRPr lang="en-US" dirty="0"/>
+              <a:rPr lang="en-US" dirty="0">
+                <a:latin typeface="Comic Sans MS" charset="0"/>
+                <a:ea typeface="Comic Sans MS" charset="0"/>
+                <a:cs typeface="Comic Sans MS" charset="0"/>
+              </a:rPr>
+              <a:t>Preliminary Development Schedule (Continued)</a:t>
+            </a:r>
           </a:p>
         </p:txBody>
       </p:sp>
@@ -5031,69 +5232,150 @@
         <p:spPr/>
         <p:txBody>
           <a:bodyPr>
-            <a:normAutofit lnSpcReduction="10000"/>
+            <a:normAutofit/>
           </a:bodyPr>
           <a:lstStyle/>
           <a:p>
             <a:r>
-              <a:rPr lang="en-US" dirty="0" err="1"/>
+              <a:rPr lang="en-US" dirty="0">
+                <a:latin typeface="Comic Sans MS" charset="0"/>
+                <a:ea typeface="Comic Sans MS" charset="0"/>
+                <a:cs typeface="Comic Sans MS" charset="0"/>
+              </a:rPr>
+              <a:t>March 11th - Admin GUI is implemented and Medium priority features should be implemented</a:t>
+            </a:r>
+          </a:p>
+          <a:p>
+            <a:r>
+              <a:rPr lang="en-US" dirty="0">
+                <a:latin typeface="Comic Sans MS" charset="0"/>
+                <a:ea typeface="Comic Sans MS" charset="0"/>
+                <a:cs typeface="Comic Sans MS" charset="0"/>
+              </a:rPr>
+              <a:t>April 3rd - Low priority features are implemented and the </a:t>
+            </a:r>
+            <a:r>
+              <a:rPr lang="en-US" dirty="0" smtClean="0">
+                <a:latin typeface="Comic Sans MS" charset="0"/>
+                <a:ea typeface="Comic Sans MS" charset="0"/>
+                <a:cs typeface="Comic Sans MS" charset="0"/>
+              </a:rPr>
+              <a:t>app </a:t>
+            </a:r>
+            <a:r>
+              <a:rPr lang="en-US" dirty="0">
+                <a:latin typeface="Comic Sans MS" charset="0"/>
+                <a:ea typeface="Comic Sans MS" charset="0"/>
+                <a:cs typeface="Comic Sans MS" charset="0"/>
+              </a:rPr>
+              <a:t>is in Alpha</a:t>
+            </a:r>
+          </a:p>
+          <a:p>
+            <a:r>
+              <a:rPr lang="en-US" dirty="0">
+                <a:latin typeface="Comic Sans MS" charset="0"/>
+                <a:ea typeface="Comic Sans MS" charset="0"/>
+                <a:cs typeface="Comic Sans MS" charset="0"/>
+              </a:rPr>
+              <a:t>May 1st - </a:t>
+            </a:r>
+            <a:r>
+              <a:rPr lang="en-US" dirty="0" err="1">
+                <a:latin typeface="Comic Sans MS" charset="0"/>
+                <a:ea typeface="Comic Sans MS" charset="0"/>
+                <a:cs typeface="Comic Sans MS" charset="0"/>
+              </a:rPr>
               <a:t>Parkit</a:t>
             </a:r>
             <a:r>
-              <a:rPr lang="en-US" dirty="0"/>
-              <a:t> is an app that solves the problem of parking.</a:t>
-            </a:r>
-            <a:endParaRPr lang="en-US" dirty="0"/>
-          </a:p>
-          <a:p>
-            <a:r>
-              <a:rPr lang="en-US" dirty="0" err="1"/>
+              <a:rPr lang="en-US" dirty="0">
+                <a:latin typeface="Comic Sans MS" charset="0"/>
+                <a:ea typeface="Comic Sans MS" charset="0"/>
+                <a:cs typeface="Comic Sans MS" charset="0"/>
+              </a:rPr>
+              <a:t> is </a:t>
+            </a:r>
+            <a:r>
+              <a:rPr lang="en-US" dirty="0" smtClean="0">
+                <a:latin typeface="Comic Sans MS" charset="0"/>
+                <a:ea typeface="Comic Sans MS" charset="0"/>
+                <a:cs typeface="Comic Sans MS" charset="0"/>
+              </a:rPr>
+              <a:t>scheduled </a:t>
+            </a:r>
+            <a:r>
+              <a:rPr lang="en-US" dirty="0">
+                <a:latin typeface="Comic Sans MS" charset="0"/>
+                <a:ea typeface="Comic Sans MS" charset="0"/>
+                <a:cs typeface="Comic Sans MS" charset="0"/>
+              </a:rPr>
+              <a:t>for Beta</a:t>
+            </a:r>
+          </a:p>
+          <a:p>
+            <a:r>
+              <a:rPr lang="en-US" dirty="0">
+                <a:latin typeface="Comic Sans MS" charset="0"/>
+                <a:ea typeface="Comic Sans MS" charset="0"/>
+                <a:cs typeface="Comic Sans MS" charset="0"/>
+              </a:rPr>
+              <a:t>June 5th </a:t>
+            </a:r>
+            <a:r>
+              <a:rPr lang="mr-IN" dirty="0" smtClean="0">
+                <a:latin typeface="Comic Sans MS" charset="0"/>
+                <a:ea typeface="Comic Sans MS" charset="0"/>
+                <a:cs typeface="Comic Sans MS" charset="0"/>
+              </a:rPr>
+              <a:t>–</a:t>
+            </a:r>
+            <a:r>
+              <a:rPr lang="en-US" dirty="0" smtClean="0">
+                <a:latin typeface="Comic Sans MS" charset="0"/>
+                <a:ea typeface="Comic Sans MS" charset="0"/>
+                <a:cs typeface="Comic Sans MS" charset="0"/>
+              </a:rPr>
+              <a:t> </a:t>
+            </a:r>
+            <a:r>
+              <a:rPr lang="en-US" dirty="0" err="1" smtClean="0">
+                <a:latin typeface="Comic Sans MS" charset="0"/>
+                <a:ea typeface="Comic Sans MS" charset="0"/>
+                <a:cs typeface="Comic Sans MS" charset="0"/>
+              </a:rPr>
               <a:t>Parkit</a:t>
             </a:r>
             <a:r>
-              <a:rPr lang="en-US" dirty="0"/>
-              <a:t> is planned to be released on iOS, Android and Web.</a:t>
-            </a:r>
-            <a:endParaRPr lang="en-US" dirty="0"/>
-          </a:p>
-          <a:p>
-            <a:r>
-              <a:rPr lang="en-US" dirty="0"/>
-              <a:t>iOS Alpha is scheduled to be released April 3rd</a:t>
-            </a:r>
-            <a:endParaRPr lang="en-US" dirty="0"/>
-          </a:p>
-          <a:p>
-            <a:r>
-              <a:rPr lang="en-US" dirty="0"/>
-              <a:t>iOS Beta is scheduled to be released May 1st</a:t>
-            </a:r>
-            <a:endParaRPr lang="en-US" dirty="0"/>
-          </a:p>
-          <a:p>
-            <a:r>
-              <a:rPr lang="en-US" dirty="0"/>
-              <a:t>An official iOS release is scheduled to be released June </a:t>
-            </a:r>
-            <a:r>
-              <a:rPr lang="en-US" dirty="0" smtClean="0"/>
-              <a:t>5th</a:t>
-            </a:r>
-            <a:r>
-              <a:rPr lang="en-US" dirty="0"/>
-              <a:t/>
-            </a:r>
-            <a:br>
-              <a:rPr lang="en-US" dirty="0"/>
-            </a:br>
-            <a:endParaRPr lang="en-US" dirty="0"/>
+              <a:rPr lang="en-US" dirty="0" smtClean="0">
+                <a:latin typeface="Comic Sans MS" charset="0"/>
+                <a:ea typeface="Comic Sans MS" charset="0"/>
+                <a:cs typeface="Comic Sans MS" charset="0"/>
+              </a:rPr>
+              <a:t> is scheduled for </a:t>
+            </a:r>
+            <a:r>
+              <a:rPr lang="en-US" dirty="0">
+                <a:latin typeface="Comic Sans MS" charset="0"/>
+                <a:ea typeface="Comic Sans MS" charset="0"/>
+                <a:cs typeface="Comic Sans MS" charset="0"/>
+              </a:rPr>
+              <a:t>released</a:t>
+            </a:r>
+          </a:p>
+          <a:p>
+            <a:endParaRPr lang="en-US" dirty="0">
+              <a:latin typeface="Comic Sans MS" charset="0"/>
+              <a:ea typeface="Comic Sans MS" charset="0"/>
+              <a:cs typeface="Comic Sans MS" charset="0"/>
+            </a:endParaRPr>
           </a:p>
         </p:txBody>
       </p:sp>
     </p:spTree>
     <p:extLst>
       <p:ext uri="{BB962C8B-B14F-4D97-AF65-F5344CB8AC3E}">
-        <p14:creationId xmlns:p14="http://schemas.microsoft.com/office/powerpoint/2010/main" val="604861929"/>
+        <p14:creationId xmlns:p14="http://schemas.microsoft.com/office/powerpoint/2010/main" val="892509732"/>
       </p:ext>
     </p:extLst>
   </p:cSld>
@@ -5101,6 +5383,13 @@
     <a:masterClrMapping/>
   </p:clrMapOvr>
   <p:transition spd="med"/>
+  <p:timing>
+    <p:tnLst>
+      <p:par>
+        <p:cTn id="1" dur="indefinite" restart="never" nodeType="tmRoot"/>
+      </p:par>
+    </p:tnLst>
+  </p:timing>
 </p:sld>
 </file>
 
@@ -5137,17 +5426,137 @@
           <a:lstStyle/>
           <a:p>
             <a:r>
-              <a:rPr lang="en-US" dirty="0" smtClean="0"/>
-              <a:t>Questions?</a:t>
-            </a:r>
-            <a:endParaRPr lang="en-US" dirty="0"/>
+              <a:rPr lang="en-US" dirty="0" smtClean="0">
+                <a:latin typeface="Comic Sans MS" charset="0"/>
+                <a:ea typeface="Comic Sans MS" charset="0"/>
+                <a:cs typeface="Comic Sans MS" charset="0"/>
+              </a:rPr>
+              <a:t>Conclusion</a:t>
+            </a:r>
+            <a:endParaRPr lang="en-US" dirty="0">
+              <a:latin typeface="Comic Sans MS" charset="0"/>
+              <a:ea typeface="Comic Sans MS" charset="0"/>
+              <a:cs typeface="Comic Sans MS" charset="0"/>
+            </a:endParaRPr>
+          </a:p>
+        </p:txBody>
+      </p:sp>
+      <p:sp>
+        <p:nvSpPr>
+          <p:cNvPr id="3" name="Text Placeholder 2"/>
+          <p:cNvSpPr>
+            <a:spLocks noGrp="1"/>
+          </p:cNvSpPr>
+          <p:nvPr>
+            <p:ph type="body" idx="1"/>
+          </p:nvPr>
+        </p:nvSpPr>
+        <p:spPr/>
+        <p:txBody>
+          <a:bodyPr>
+            <a:normAutofit fontScale="92500"/>
+          </a:bodyPr>
+          <a:lstStyle/>
+          <a:p>
+            <a:r>
+              <a:rPr lang="en-US" dirty="0" err="1">
+                <a:latin typeface="Comic Sans MS" charset="0"/>
+                <a:ea typeface="Comic Sans MS" charset="0"/>
+                <a:cs typeface="Comic Sans MS" charset="0"/>
+              </a:rPr>
+              <a:t>Parkit</a:t>
+            </a:r>
+            <a:r>
+              <a:rPr lang="en-US" dirty="0">
+                <a:latin typeface="Comic Sans MS" charset="0"/>
+                <a:ea typeface="Comic Sans MS" charset="0"/>
+                <a:cs typeface="Comic Sans MS" charset="0"/>
+              </a:rPr>
+              <a:t> is an app that solves the problem of parking.</a:t>
+            </a:r>
+          </a:p>
+          <a:p>
+            <a:r>
+              <a:rPr lang="en-US" dirty="0" err="1">
+                <a:latin typeface="Comic Sans MS" charset="0"/>
+                <a:ea typeface="Comic Sans MS" charset="0"/>
+                <a:cs typeface="Comic Sans MS" charset="0"/>
+              </a:rPr>
+              <a:t>Parkit</a:t>
+            </a:r>
+            <a:r>
+              <a:rPr lang="en-US" dirty="0">
+                <a:latin typeface="Comic Sans MS" charset="0"/>
+                <a:ea typeface="Comic Sans MS" charset="0"/>
+                <a:cs typeface="Comic Sans MS" charset="0"/>
+              </a:rPr>
+              <a:t> is planned to be released on iOS, Android and Web.</a:t>
+            </a:r>
+          </a:p>
+          <a:p>
+            <a:r>
+              <a:rPr lang="en-US" dirty="0">
+                <a:latin typeface="Comic Sans MS" charset="0"/>
+                <a:ea typeface="Comic Sans MS" charset="0"/>
+                <a:cs typeface="Comic Sans MS" charset="0"/>
+              </a:rPr>
+              <a:t>iOS Alpha is scheduled to be released April 3rd</a:t>
+            </a:r>
+          </a:p>
+          <a:p>
+            <a:r>
+              <a:rPr lang="en-US" dirty="0">
+                <a:latin typeface="Comic Sans MS" charset="0"/>
+                <a:ea typeface="Comic Sans MS" charset="0"/>
+                <a:cs typeface="Comic Sans MS" charset="0"/>
+              </a:rPr>
+              <a:t>iOS Beta is scheduled to be released May 1st</a:t>
+            </a:r>
+          </a:p>
+          <a:p>
+            <a:r>
+              <a:rPr lang="en-US" dirty="0">
+                <a:latin typeface="Comic Sans MS" charset="0"/>
+                <a:ea typeface="Comic Sans MS" charset="0"/>
+                <a:cs typeface="Comic Sans MS" charset="0"/>
+              </a:rPr>
+              <a:t>An official iOS release is scheduled to be released June </a:t>
+            </a:r>
+            <a:r>
+              <a:rPr lang="en-US" dirty="0" smtClean="0">
+                <a:latin typeface="Comic Sans MS" charset="0"/>
+                <a:ea typeface="Comic Sans MS" charset="0"/>
+                <a:cs typeface="Comic Sans MS" charset="0"/>
+              </a:rPr>
+              <a:t>5th</a:t>
+            </a:r>
+            <a:r>
+              <a:rPr lang="en-US" dirty="0">
+                <a:latin typeface="Comic Sans MS" charset="0"/>
+                <a:ea typeface="Comic Sans MS" charset="0"/>
+                <a:cs typeface="Comic Sans MS" charset="0"/>
+              </a:rPr>
+              <a:t/>
+            </a:r>
+            <a:br>
+              <a:rPr lang="en-US" dirty="0">
+                <a:latin typeface="Comic Sans MS" charset="0"/>
+                <a:ea typeface="Comic Sans MS" charset="0"/>
+                <a:cs typeface="Comic Sans MS" charset="0"/>
+              </a:rPr>
+            </a:br>
+            <a:endParaRPr lang="en-US" dirty="0">
+              <a:latin typeface="Comic Sans MS" charset="0"/>
+              <a:ea typeface="Comic Sans MS" charset="0"/>
+              <a:cs typeface="Comic Sans MS" charset="0"/>
+            </a:endParaRPr>
           </a:p>
         </p:txBody>
       </p:sp>
     </p:spTree>
     <p:extLst>
       <p:ext uri="{BB962C8B-B14F-4D97-AF65-F5344CB8AC3E}">
-        <p14:creationId xmlns:p14="http://schemas.microsoft.com/office/powerpoint/2010/main" val="1724231594"/>
+        <p14:creationId xmlns:p14="http://schemas.microsoft.com/office/powerpoint/2010/main" val="604861929"/>
       </p:ext>
     </p:extLst>
   </p:cSld>
@@ -5155,6 +5564,13 @@
     <a:masterClrMapping/>
   </p:clrMapOvr>
   <p:transition spd="med"/>
+  <p:timing>
+    <p:tnLst>
+      <p:par>
+        <p:cTn id="1" dur="indefinite" restart="never" nodeType="tmRoot"/>
+      </p:par>
+    </p:tnLst>
+  </p:timing>
 </p:sld>
 </file>
 
@@ -5191,6 +5607,79 @@
           <a:lstStyle/>
           <a:p>
             <a:r>
+              <a:rPr lang="en-US" dirty="0" smtClean="0">
+                <a:latin typeface="+mj-lt"/>
+                <a:ea typeface="Comic Sans MS" charset="0"/>
+                <a:cs typeface="Comic Sans MS" charset="0"/>
+              </a:rPr>
+              <a:t>Questions</a:t>
+            </a:r>
+            <a:r>
+              <a:rPr lang="en-US" dirty="0" smtClean="0">
+                <a:latin typeface="+mj-lt"/>
+              </a:rPr>
+              <a:t>?</a:t>
+            </a:r>
+            <a:endParaRPr lang="en-US" dirty="0">
+              <a:latin typeface="+mj-lt"/>
+            </a:endParaRPr>
+          </a:p>
+        </p:txBody>
+      </p:sp>
+    </p:spTree>
+    <p:extLst>
+      <p:ext uri="{BB962C8B-B14F-4D97-AF65-F5344CB8AC3E}">
+        <p14:creationId xmlns:p14="http://schemas.microsoft.com/office/powerpoint/2010/main" val="1724231594"/>
+      </p:ext>
+    </p:extLst>
+  </p:cSld>
+  <p:clrMapOvr>
+    <a:masterClrMapping/>
+  </p:clrMapOvr>
+  <p:transition spd="med"/>
+  <p:timing>
+    <p:tnLst>
+      <p:par>
+        <p:cTn id="1" dur="indefinite" restart="never" nodeType="tmRoot"/>
+      </p:par>
+    </p:tnLst>
+  </p:timing>
+</p:sld>
+</file>
+
+<file path=ppt/slides/slide23.xml><?xml version="1.0" encoding="utf-8"?>
+<p:sld xmlns:a="http://schemas.openxmlformats.org/drawingml/2006/main" xmlns:r="http://schemas.openxmlformats.org/officeDocument/2006/relationships" xmlns:p="http://schemas.openxmlformats.org/presentationml/2006/main">
+  <p:cSld>
+    <p:spTree>
+      <p:nvGrpSpPr>
+        <p:cNvPr id="1" name=""/>
+        <p:cNvGrpSpPr/>
+        <p:nvPr/>
+      </p:nvGrpSpPr>
+      <p:grpSpPr>
+        <a:xfrm>
+          <a:off x="0" y="0"/>
+          <a:ext cx="0" cy="0"/>
+          <a:chOff x="0" y="0"/>
+          <a:chExt cx="0" cy="0"/>
+        </a:xfrm>
+      </p:grpSpPr>
+      <p:sp>
+        <p:nvSpPr>
+          <p:cNvPr id="2" name="Title 1"/>
+          <p:cNvSpPr>
+            <a:spLocks noGrp="1"/>
+          </p:cNvSpPr>
+          <p:nvPr>
+            <p:ph type="title"/>
+          </p:nvPr>
+        </p:nvSpPr>
+        <p:spPr/>
+        <p:txBody>
+          <a:bodyPr/>
+          <a:lstStyle/>
+          <a:p>
+            <a:r>
               <a:rPr lang="en-US" dirty="0" smtClean="0"/>
               <a:t>Thank You!</a:t>
             </a:r>
@@ -5209,6 +5698,13 @@
     <a:masterClrMapping/>
   </p:clrMapOvr>
   <p:transition spd="med"/>
+  <p:timing>
+    <p:tnLst>
+      <p:par>
+        <p:cTn id="1" dur="indefinite" restart="never" nodeType="tmRoot"/>
+      </p:par>
+    </p:tnLst>
+  </p:timing>
 </p:sld>
 </file>
 
@@ -5245,10 +5741,13 @@
           <a:lstStyle/>
           <a:p>
             <a:r>
-              <a:rPr lang="en-US" dirty="0"/>
+              <a:rPr lang="en-US" dirty="0">
+                <a:latin typeface="Comic Sans MS" charset="0"/>
+                <a:ea typeface="Comic Sans MS" charset="0"/>
+                <a:cs typeface="Comic Sans MS" charset="0"/>
+              </a:rPr>
               <a:t>Justification</a:t>
             </a:r>
-            <a:endParaRPr lang="en-US" dirty="0"/>
           </a:p>
         </p:txBody>
       </p:sp>
@@ -5268,29 +5767,52 @@
           <a:lstStyle/>
           <a:p>
             <a:r>
-              <a:rPr lang="en-US" dirty="0"/>
+              <a:rPr lang="en-US" dirty="0">
+                <a:latin typeface="Comic Sans MS" charset="0"/>
+                <a:ea typeface="Comic Sans MS" charset="0"/>
+                <a:cs typeface="Comic Sans MS" charset="0"/>
+              </a:rPr>
               <a:t>This project helps aim to provide a cheaper alternative to nearby expensive lots. And allows homeowners to make passive income while they are at work.</a:t>
             </a:r>
-            <a:endParaRPr lang="en-US" dirty="0"/>
-          </a:p>
-          <a:p>
-            <a:r>
-              <a:rPr lang="en-US" dirty="0"/>
+          </a:p>
+          <a:p>
+            <a:r>
+              <a:rPr lang="en-US" dirty="0">
+                <a:latin typeface="Comic Sans MS" charset="0"/>
+                <a:ea typeface="Comic Sans MS" charset="0"/>
+                <a:cs typeface="Comic Sans MS" charset="0"/>
+              </a:rPr>
               <a:t>This project will involve knowledge learned from class like Computer </a:t>
             </a:r>
             <a:r>
-              <a:rPr lang="en-US" dirty="0" err="1"/>
-              <a:t>Porgramming</a:t>
-            </a:r>
-            <a:r>
-              <a:rPr lang="en-US" dirty="0"/>
+              <a:rPr lang="en-US" dirty="0" smtClean="0">
+                <a:latin typeface="Comic Sans MS" charset="0"/>
+                <a:ea typeface="Comic Sans MS" charset="0"/>
+                <a:cs typeface="Comic Sans MS" charset="0"/>
+              </a:rPr>
+              <a:t>Programming</a:t>
+            </a:r>
+            <a:r>
+              <a:rPr lang="en-US" dirty="0">
+                <a:latin typeface="Comic Sans MS" charset="0"/>
+                <a:ea typeface="Comic Sans MS" charset="0"/>
+                <a:cs typeface="Comic Sans MS" charset="0"/>
+              </a:rPr>
               <a:t>, Data Structures, Algorithms, Interaction Design and Databases</a:t>
             </a:r>
             <a:r>
-              <a:rPr lang="en-US" dirty="0" smtClean="0"/>
+              <a:rPr lang="en-US" dirty="0" smtClean="0">
+                <a:latin typeface="Comic Sans MS" charset="0"/>
+                <a:ea typeface="Comic Sans MS" charset="0"/>
+                <a:cs typeface="Comic Sans MS" charset="0"/>
+              </a:rPr>
               <a:t>.</a:t>
             </a:r>
-            <a:endParaRPr lang="en-US" dirty="0"/>
+            <a:endParaRPr lang="en-US" dirty="0">
+              <a:latin typeface="Comic Sans MS" charset="0"/>
+              <a:ea typeface="Comic Sans MS" charset="0"/>
+              <a:cs typeface="Comic Sans MS" charset="0"/>
+            </a:endParaRPr>
           </a:p>
         </p:txBody>
       </p:sp>
@@ -5305,6 +5827,13 @@
     <a:masterClrMapping/>
   </p:clrMapOvr>
   <p:transition spd="med"/>
+  <p:timing>
+    <p:tnLst>
+      <p:par>
+        <p:cTn id="1" dur="indefinite" restart="never" nodeType="tmRoot"/>
+      </p:par>
+    </p:tnLst>
+  </p:timing>
 </p:sld>
 </file>
 
@@ -5623,8 +6152,8 @@
         </p:nvSpPr>
         <p:spPr>
           <a:xfrm>
-            <a:off x="3866641" y="216449"/>
-            <a:ext cx="5271517" cy="647701"/>
+            <a:off x="5591891" y="212005"/>
+            <a:ext cx="1821011" cy="656590"/>
           </a:xfrm>
           <a:prstGeom prst="rect">
             <a:avLst/>
@@ -5645,8 +6174,10 @@
           <a:lstStyle/>
           <a:p>
             <a:r>
-              <a:t>Register / First Time User</a:t>
-            </a:r>
+              <a:rPr dirty="0" smtClean="0"/>
+              <a:t>Register</a:t>
+            </a:r>
+            <a:endParaRPr dirty="0"/>
           </a:p>
         </p:txBody>
       </p:sp>

</xml_diff>